<commit_message>
small typo in hmac
</commit_message>
<xml_diff>
--- a/Lectures/MACsLite.pptx
+++ b/Lectures/MACsLite.pptx
@@ -227,7 +227,7 @@
           <a:p>
             <a:fld id="{CBA08D16-15DC-4E25-BDC3-F25146157B16}" type="datetimeFigureOut">
               <a:rPr lang="ru-RU" smtClean="0"/>
-              <a:t>15.04.2020</a:t>
+              <a:t>18.03.2021</a:t>
             </a:fld>
             <a:endParaRPr lang="ru-RU"/>
           </a:p>
@@ -626,7 +626,7 @@
           <a:p>
             <a:fld id="{FCEC8293-DB51-454A-BE81-EC8FCB31EBA2}" type="datetime1">
               <a:rPr lang="ru-RU" smtClean="0"/>
-              <a:t>15.04.2020</a:t>
+              <a:t>18.03.2021</a:t>
             </a:fld>
             <a:endParaRPr lang="ru-RU"/>
           </a:p>
@@ -800,7 +800,7 @@
           <a:p>
             <a:fld id="{241C87B1-1C35-4DBD-BC18-2BC72E776603}" type="datetime1">
               <a:rPr lang="ru-RU" smtClean="0"/>
-              <a:t>15.04.2020</a:t>
+              <a:t>18.03.2021</a:t>
             </a:fld>
             <a:endParaRPr lang="ru-RU"/>
           </a:p>
@@ -984,7 +984,7 @@
           <a:p>
             <a:fld id="{3134C275-26C0-42CD-9111-9ADE65922AF9}" type="datetime1">
               <a:rPr lang="ru-RU" smtClean="0"/>
-              <a:t>15.04.2020</a:t>
+              <a:t>18.03.2021</a:t>
             </a:fld>
             <a:endParaRPr lang="ru-RU"/>
           </a:p>
@@ -1158,7 +1158,7 @@
           <a:p>
             <a:fld id="{C1A9A50B-C350-45F5-8AAB-ADB9E670AF2E}" type="datetime1">
               <a:rPr lang="ru-RU" smtClean="0"/>
-              <a:t>15.04.2020</a:t>
+              <a:t>18.03.2021</a:t>
             </a:fld>
             <a:endParaRPr lang="ru-RU"/>
           </a:p>
@@ -1408,7 +1408,7 @@
           <a:p>
             <a:fld id="{089688C9-348F-42F9-B6C0-5990DDE0C5B2}" type="datetime1">
               <a:rPr lang="ru-RU" smtClean="0"/>
-              <a:t>15.04.2020</a:t>
+              <a:t>18.03.2021</a:t>
             </a:fld>
             <a:endParaRPr lang="ru-RU"/>
           </a:p>
@@ -1644,7 +1644,7 @@
           <a:p>
             <a:fld id="{684AFD8F-6DD9-4AD3-A505-FDC3F5C5F3F6}" type="datetime1">
               <a:rPr lang="ru-RU" smtClean="0"/>
-              <a:t>15.04.2020</a:t>
+              <a:t>18.03.2021</a:t>
             </a:fld>
             <a:endParaRPr lang="ru-RU"/>
           </a:p>
@@ -2015,7 +2015,7 @@
           <a:p>
             <a:fld id="{63551EFE-4D02-45EB-A747-8B6F047B5AA0}" type="datetime1">
               <a:rPr lang="ru-RU" smtClean="0"/>
-              <a:t>15.04.2020</a:t>
+              <a:t>18.03.2021</a:t>
             </a:fld>
             <a:endParaRPr lang="ru-RU"/>
           </a:p>
@@ -2137,7 +2137,7 @@
           <a:p>
             <a:fld id="{813A9F34-E5CD-4B8F-AA9E-889C84372B20}" type="datetime1">
               <a:rPr lang="ru-RU" smtClean="0"/>
-              <a:t>15.04.2020</a:t>
+              <a:t>18.03.2021</a:t>
             </a:fld>
             <a:endParaRPr lang="ru-RU"/>
           </a:p>
@@ -2236,7 +2236,7 @@
           <a:p>
             <a:fld id="{51224D22-9B29-44A6-8E82-95FC492DEDC1}" type="datetime1">
               <a:rPr lang="ru-RU" smtClean="0"/>
-              <a:t>15.04.2020</a:t>
+              <a:t>18.03.2021</a:t>
             </a:fld>
             <a:endParaRPr lang="ru-RU"/>
           </a:p>
@@ -2517,7 +2517,7 @@
           <a:p>
             <a:fld id="{91D1034F-4441-48A1-BDC0-25EA1022324A}" type="datetime1">
               <a:rPr lang="ru-RU" smtClean="0"/>
-              <a:t>15.04.2020</a:t>
+              <a:t>18.03.2021</a:t>
             </a:fld>
             <a:endParaRPr lang="ru-RU"/>
           </a:p>
@@ -2774,7 +2774,7 @@
           <a:p>
             <a:fld id="{B0FFDE79-B627-473B-AE17-4C65BD2495F7}" type="datetime1">
               <a:rPr lang="ru-RU" smtClean="0"/>
-              <a:t>15.04.2020</a:t>
+              <a:t>18.03.2021</a:t>
             </a:fld>
             <a:endParaRPr lang="ru-RU"/>
           </a:p>
@@ -2991,7 +2991,7 @@
           <a:p>
             <a:fld id="{11CA537A-1B8C-47BA-9BA6-7CE3FAFDA8BE}" type="datetime1">
               <a:rPr lang="ru-RU" smtClean="0"/>
-              <a:t>15.04.2020</a:t>
+              <a:t>18.03.2021</a:t>
             </a:fld>
             <a:endParaRPr lang="ru-RU"/>
           </a:p>
@@ -6714,6 +6714,13 @@
   <p:clrMapOvr>
     <a:masterClrMapping/>
   </p:clrMapOvr>
+  <p:timing>
+    <p:tnLst>
+      <p:par>
+        <p:cTn id="1" dur="indefinite" restart="never" nodeType="tmRoot"/>
+      </p:par>
+    </p:tnLst>
+  </p:timing>
 </p:sld>
 </file>
 
@@ -6836,6 +6843,13 @@
   <p:clrMapOvr>
     <a:masterClrMapping/>
   </p:clrMapOvr>
+  <p:timing>
+    <p:tnLst>
+      <p:par>
+        <p:cTn id="1" dur="indefinite" restart="never" nodeType="tmRoot"/>
+      </p:par>
+    </p:tnLst>
+  </p:timing>
 </p:sld>
 </file>
 
@@ -6958,6 +6972,13 @@
   <p:clrMapOvr>
     <a:masterClrMapping/>
   </p:clrMapOvr>
+  <p:timing>
+    <p:tnLst>
+      <p:par>
+        <p:cTn id="1" dur="indefinite" restart="never" nodeType="tmRoot"/>
+      </p:par>
+    </p:tnLst>
+  </p:timing>
 </p:sld>
 </file>
 
@@ -7415,6 +7436,13 @@
   <p:clrMapOvr>
     <a:masterClrMapping/>
   </p:clrMapOvr>
+  <p:timing>
+    <p:tnLst>
+      <p:par>
+        <p:cTn id="1" dur="indefinite" restart="never" nodeType="tmRoot"/>
+      </p:par>
+    </p:tnLst>
+  </p:timing>
 </p:sld>
 </file>
 
@@ -7544,6 +7572,13 @@
   <p:clrMapOvr>
     <a:masterClrMapping/>
   </p:clrMapOvr>
+  <p:timing>
+    <p:tnLst>
+      <p:par>
+        <p:cTn id="1" dur="indefinite" restart="never" nodeType="tmRoot"/>
+      </p:par>
+    </p:tnLst>
+  </p:timing>
 </p:sld>
 </file>
 
@@ -8943,6 +8978,13 @@
   <p:clrMapOvr>
     <a:masterClrMapping/>
   </p:clrMapOvr>
+  <p:timing>
+    <p:tnLst>
+      <p:par>
+        <p:cTn id="1" dur="indefinite" restart="never" nodeType="tmRoot"/>
+      </p:par>
+    </p:tnLst>
+  </p:timing>
 </p:sld>
 </file>
 
@@ -9137,6 +9179,13 @@
   <p:clrMapOvr>
     <a:masterClrMapping/>
   </p:clrMapOvr>
+  <p:timing>
+    <p:tnLst>
+      <p:par>
+        <p:cTn id="1" dur="indefinite" restart="never" nodeType="tmRoot"/>
+      </p:par>
+    </p:tnLst>
+  </p:timing>
 </p:sld>
 </file>
 
@@ -9464,6 +9513,13 @@
   <p:clrMapOvr>
     <a:masterClrMapping/>
   </p:clrMapOvr>
+  <p:timing>
+    <p:tnLst>
+      <p:par>
+        <p:cTn id="1" dur="indefinite" restart="never" nodeType="tmRoot"/>
+      </p:par>
+    </p:tnLst>
+  </p:timing>
 </p:sld>
 </file>
 
@@ -10040,13 +10096,7 @@
                         <a:rPr lang="en-US" b="0" i="1" dirty="0" smtClean="0">
                           <a:latin typeface="Cambria Math" panose="02040503050406030204" pitchFamily="18" charset="0"/>
                         </a:rPr>
-                        <m:t>|</m:t>
-                      </m:r>
-                      <m:r>
-                        <a:rPr lang="en-US" b="0" i="1" dirty="0" smtClean="0">
-                          <a:latin typeface="Cambria Math" panose="02040503050406030204" pitchFamily="18" charset="0"/>
-                        </a:rPr>
-                        <m:t>|</m:t>
+                        <m:t>||</m:t>
                       </m:r>
                       <m:r>
                         <a:rPr lang="en-US" i="1" dirty="0">
@@ -10095,6 +10145,12 @@
                           </m:r>
                         </m:e>
                       </m:d>
+                      <m:r>
+                        <a:rPr lang="ru-RU" b="0" i="1" dirty="0" smtClean="0">
+                          <a:latin typeface="Cambria Math" panose="02040503050406030204" pitchFamily="18" charset="0"/>
+                        </a:rPr>
+                        <m:t>)</m:t>
+                      </m:r>
                     </m:oMath>
                   </m:oMathPara>
                 </a14:m>
@@ -10173,6 +10229,13 @@
   <p:clrMapOvr>
     <a:masterClrMapping/>
   </p:clrMapOvr>
+  <p:timing>
+    <p:tnLst>
+      <p:par>
+        <p:cTn id="1" dur="indefinite" restart="never" nodeType="tmRoot"/>
+      </p:par>
+    </p:tnLst>
+  </p:timing>
 </p:sld>
 </file>
 
@@ -10325,6 +10388,13 @@
   <p:clrMapOvr>
     <a:masterClrMapping/>
   </p:clrMapOvr>
+  <p:timing>
+    <p:tnLst>
+      <p:par>
+        <p:cTn id="1" dur="indefinite" restart="never" nodeType="tmRoot"/>
+      </p:par>
+    </p:tnLst>
+  </p:timing>
 </p:sld>
 </file>
 
@@ -12650,6 +12720,13 @@
   <p:clrMapOvr>
     <a:masterClrMapping/>
   </p:clrMapOvr>
+  <p:timing>
+    <p:tnLst>
+      <p:par>
+        <p:cTn id="1" dur="indefinite" restart="never" nodeType="tmRoot"/>
+      </p:par>
+    </p:tnLst>
+  </p:timing>
 </p:sld>
 </file>
 
@@ -13078,6 +13155,13 @@
   <p:clrMapOvr>
     <a:masterClrMapping/>
   </p:clrMapOvr>
+  <p:timing>
+    <p:tnLst>
+      <p:par>
+        <p:cTn id="1" dur="indefinite" restart="never" nodeType="tmRoot"/>
+      </p:par>
+    </p:tnLst>
+  </p:timing>
 </p:sld>
 </file>
 
@@ -13248,6 +13332,13 @@
   <p:clrMapOvr>
     <a:masterClrMapping/>
   </p:clrMapOvr>
+  <p:timing>
+    <p:tnLst>
+      <p:par>
+        <p:cTn id="1" dur="indefinite" restart="never" nodeType="tmRoot"/>
+      </p:par>
+    </p:tnLst>
+  </p:timing>
 </p:sld>
 </file>
 

</xml_diff>